<commit_message>
aufgabe in teil 1-6 zerlegt
</commit_message>
<xml_diff>
--- a/folien/Semester_03_Termin_07_Kapitel06.pptx
+++ b/folien/Semester_03_Termin_07_Kapitel06.pptx
@@ -10272,13 +10272,26 @@
               </a:tabLst>
             </a:pPr>
             <a:r>
-              <a:rPr lang="de-DE" sz="4000" smtClean="0">
+              <a:rPr lang="de-DE" sz="4000" dirty="0" smtClean="0">
                 <a:solidFill>
                   <a:srgbClr val="FFFFFF"/>
                 </a:solidFill>
               </a:rPr>
-              <a:t>Exemplare – Übung 1</a:t>
-            </a:r>
+              <a:t>Exemplare – Übung </a:t>
+            </a:r>
+            <a:r>
+              <a:rPr lang="de-DE" sz="4000" dirty="0" smtClean="0">
+                <a:solidFill>
+                  <a:srgbClr val="FFFFFF"/>
+                </a:solidFill>
+              </a:rPr>
+              <a:t>(Teil 1)</a:t>
+            </a:r>
+            <a:endParaRPr lang="de-DE" sz="4000" dirty="0" smtClean="0">
+              <a:solidFill>
+                <a:srgbClr val="FFFFFF"/>
+              </a:solidFill>
+            </a:endParaRPr>
           </a:p>
         </p:txBody>
       </p:sp>
@@ -13088,9 +13101,14 @@
               </a:tabLst>
             </a:pPr>
             <a:r>
-              <a:rPr lang="de-DE" smtClean="0"/>
-              <a:t>Objektorientierte Programmierung</a:t>
-            </a:r>
+              <a:rPr lang="de-DE" dirty="0" smtClean="0"/>
+              <a:t>Objektorientierte </a:t>
+            </a:r>
+            <a:r>
+              <a:rPr lang="de-DE" dirty="0" smtClean="0"/>
+              <a:t>Programmierung</a:t>
+            </a:r>
+            <a:endParaRPr lang="de-DE" dirty="0" smtClean="0"/>
           </a:p>
           <a:p>
             <a:pPr marL="269875" indent="-269875" eaLnBrk="1">
@@ -13115,7 +13133,44 @@
                 <a:tab pos="8686800" algn="l"/>
               </a:tabLst>
             </a:pPr>
-            <a:endParaRPr lang="de-DE" smtClean="0"/>
+            <a:endParaRPr lang="de-DE" dirty="0" smtClean="0"/>
+          </a:p>
+        </p:txBody>
+      </p:sp>
+      <p:sp>
+        <p:nvSpPr>
+          <p:cNvPr id="2" name="Rechteck 1"/>
+          <p:cNvSpPr/>
+          <p:nvPr/>
+        </p:nvSpPr>
+        <p:spPr>
+          <a:xfrm>
+            <a:off x="1871960" y="4870029"/>
+            <a:ext cx="6552728" cy="349968"/>
+          </a:xfrm>
+          <a:prstGeom prst="rect">
+            <a:avLst/>
+          </a:prstGeom>
+        </p:spPr>
+        <p:txBody>
+          <a:bodyPr wrap="square">
+            <a:spAutoFit/>
+          </a:bodyPr>
+          <a:lstStyle/>
+          <a:p>
+            <a:r>
+              <a:rPr lang="en-US" dirty="0">
+                <a:hlinkClick r:id="rId3"/>
+              </a:rPr>
+              <a:t>https://</a:t>
+            </a:r>
+            <a:r>
+              <a:rPr lang="en-US" dirty="0" smtClean="0">
+                <a:hlinkClick r:id="rId3"/>
+              </a:rPr>
+              <a:t>github.com/nordakademie-einfuehrung-java/uebung_6</a:t>
+            </a:r>
+            <a:endParaRPr lang="en-US" dirty="0"/>
           </a:p>
         </p:txBody>
       </p:sp>
@@ -13297,13 +13352,26 @@
               </a:tabLst>
             </a:pPr>
             <a:r>
-              <a:rPr lang="de-DE" sz="4000" smtClean="0">
+              <a:rPr lang="de-DE" sz="4000" dirty="0" smtClean="0">
                 <a:solidFill>
                   <a:srgbClr val="FFFFFF"/>
                 </a:solidFill>
               </a:rPr>
-              <a:t>Exemplare – Übung 2</a:t>
-            </a:r>
+              <a:t>Exemplare – Übung </a:t>
+            </a:r>
+            <a:r>
+              <a:rPr lang="de-DE" sz="4000" dirty="0" smtClean="0">
+                <a:solidFill>
+                  <a:srgbClr val="FFFFFF"/>
+                </a:solidFill>
+              </a:rPr>
+              <a:t>(Teil 2)</a:t>
+            </a:r>
+            <a:endParaRPr lang="de-DE" sz="4000" dirty="0" smtClean="0">
+              <a:solidFill>
+                <a:srgbClr val="FFFFFF"/>
+              </a:solidFill>
+            </a:endParaRPr>
           </a:p>
         </p:txBody>
       </p:sp>
@@ -13428,11 +13496,7 @@
             </a:pPr>
             <a:r>
               <a:rPr lang="de-DE" sz="2800" dirty="0" smtClean="0"/>
-              <a:t>Implementieren Sie folgende Methode, um den Tank </a:t>
-            </a:r>
-            <a:r>
-              <a:rPr lang="de-DE" sz="2800" dirty="0" smtClean="0"/>
-              <a:t>aufzufüllen: </a:t>
+              <a:t>Implementieren Sie folgende Methode, um den Tank aufzufüllen: </a:t>
             </a:r>
             <a:r>
               <a:rPr lang="de-DE" sz="2800" dirty="0" smtClean="0">
@@ -15686,13 +15750,26 @@
               </a:tabLst>
             </a:pPr>
             <a:r>
-              <a:rPr lang="de-DE" sz="4000" smtClean="0">
+              <a:rPr lang="de-DE" sz="4000" dirty="0" smtClean="0">
                 <a:solidFill>
                   <a:srgbClr val="FFFFFF"/>
                 </a:solidFill>
               </a:rPr>
-              <a:t>Übung 1</a:t>
-            </a:r>
+              <a:t>Übung </a:t>
+            </a:r>
+            <a:r>
+              <a:rPr lang="de-DE" sz="4000" dirty="0" smtClean="0">
+                <a:solidFill>
+                  <a:srgbClr val="FFFFFF"/>
+                </a:solidFill>
+              </a:rPr>
+              <a:t>(Teil 3)</a:t>
+            </a:r>
+            <a:endParaRPr lang="de-DE" sz="4000" dirty="0" smtClean="0">
+              <a:solidFill>
+                <a:srgbClr val="FFFFFF"/>
+              </a:solidFill>
+            </a:endParaRPr>
           </a:p>
         </p:txBody>
       </p:sp>
@@ -16015,13 +16092,26 @@
               </a:tabLst>
             </a:pPr>
             <a:r>
-              <a:rPr lang="de-DE" sz="4000" smtClean="0">
+              <a:rPr lang="de-DE" sz="4000" dirty="0" smtClean="0">
                 <a:solidFill>
                   <a:srgbClr val="FFFFFF"/>
                 </a:solidFill>
               </a:rPr>
-              <a:t>Übung 2</a:t>
-            </a:r>
+              <a:t>Übung </a:t>
+            </a:r>
+            <a:r>
+              <a:rPr lang="de-DE" sz="4000" dirty="0" smtClean="0">
+                <a:solidFill>
+                  <a:srgbClr val="FFFFFF"/>
+                </a:solidFill>
+              </a:rPr>
+              <a:t>(Teil 4)</a:t>
+            </a:r>
+            <a:endParaRPr lang="de-DE" sz="4000" dirty="0" smtClean="0">
+              <a:solidFill>
+                <a:srgbClr val="FFFFFF"/>
+              </a:solidFill>
+            </a:endParaRPr>
           </a:p>
         </p:txBody>
       </p:sp>
@@ -16426,13 +16516,26 @@
               </a:tabLst>
             </a:pPr>
             <a:r>
-              <a:rPr lang="de-DE" sz="4000" smtClean="0">
+              <a:rPr lang="de-DE" sz="4000" dirty="0" smtClean="0">
                 <a:solidFill>
                   <a:srgbClr val="FFFFFF"/>
                 </a:solidFill>
               </a:rPr>
-              <a:t>Übung 3</a:t>
-            </a:r>
+              <a:t>Übung </a:t>
+            </a:r>
+            <a:r>
+              <a:rPr lang="de-DE" sz="4000" dirty="0" smtClean="0">
+                <a:solidFill>
+                  <a:srgbClr val="FFFFFF"/>
+                </a:solidFill>
+              </a:rPr>
+              <a:t>(Teil 5)</a:t>
+            </a:r>
+            <a:endParaRPr lang="de-DE" sz="4000" dirty="0" smtClean="0">
+              <a:solidFill>
+                <a:srgbClr val="FFFFFF"/>
+              </a:solidFill>
+            </a:endParaRPr>
           </a:p>
         </p:txBody>
       </p:sp>
@@ -16810,13 +16913,26 @@
               </a:tabLst>
             </a:pPr>
             <a:r>
-              <a:rPr lang="de-DE" sz="4000" smtClean="0">
+              <a:rPr lang="de-DE" sz="4000" dirty="0" smtClean="0">
                 <a:solidFill>
                   <a:srgbClr val="FFFFFF"/>
                 </a:solidFill>
               </a:rPr>
-              <a:t>Übung 4</a:t>
-            </a:r>
+              <a:t>Übung </a:t>
+            </a:r>
+            <a:r>
+              <a:rPr lang="de-DE" sz="4000" dirty="0" smtClean="0">
+                <a:solidFill>
+                  <a:srgbClr val="FFFFFF"/>
+                </a:solidFill>
+              </a:rPr>
+              <a:t>(Teil 6)</a:t>
+            </a:r>
+            <a:endParaRPr lang="de-DE" sz="4000" dirty="0" smtClean="0">
+              <a:solidFill>
+                <a:srgbClr val="FFFFFF"/>
+              </a:solidFill>
+            </a:endParaRPr>
           </a:p>
         </p:txBody>
       </p:sp>

</xml_diff>

<commit_message>
Auto statt Point als null-Beispiel
</commit_message>
<xml_diff>
--- a/folien/Semester_03_Termin_07_Kapitel06.pptx
+++ b/folien/Semester_03_Termin_07_Kapitel06.pptx
@@ -210,7 +210,7 @@
   </p:defaultTextStyle>
   <p:extLst>
     <p:ext uri="{EFAFB233-063F-42B5-8137-9DF3F51BA10A}">
-      <p15:sldGuideLst xmlns:p15="http://schemas.microsoft.com/office/powerpoint/2012/main" xmlns="">
+      <p15:sldGuideLst xmlns:p15="http://schemas.microsoft.com/office/powerpoint/2012/main">
         <p15:guide id="1" orient="horz" pos="2160">
           <p15:clr>
             <a:srgbClr val="A4A3A4"/>
@@ -224,7 +224,7 @@
       </p15:sldGuideLst>
     </p:ext>
     <p:ext uri="{2D200454-40CA-4A62-9FC3-DE9A4176ACB9}">
-      <p15:notesGuideLst xmlns:p15="http://schemas.microsoft.com/office/powerpoint/2012/main" xmlns="">
+      <p15:notesGuideLst xmlns:p15="http://schemas.microsoft.com/office/powerpoint/2012/main">
         <p15:guide id="1" orient="horz" pos="2880">
           <p15:clr>
             <a:srgbClr val="A4A3A4"/>
@@ -583,7 +583,7 @@
     </p:spTree>
     <p:extLst>
       <p:ext uri="{BB962C8B-B14F-4D97-AF65-F5344CB8AC3E}">
-        <p14:creationId xmlns:p14="http://schemas.microsoft.com/office/powerpoint/2010/main" xmlns="" val="2679869077"/>
+        <p14:creationId xmlns:p14="http://schemas.microsoft.com/office/powerpoint/2010/main" val="2679869077"/>
       </p:ext>
     </p:extLst>
   </p:cSld>
@@ -844,7 +844,7 @@
     </p:spTree>
     <p:extLst>
       <p:ext uri="{BB962C8B-B14F-4D97-AF65-F5344CB8AC3E}">
-        <p14:creationId xmlns:p14="http://schemas.microsoft.com/office/powerpoint/2010/main" xmlns="" val="1184811386"/>
+        <p14:creationId xmlns:p14="http://schemas.microsoft.com/office/powerpoint/2010/main" val="1184811386"/>
       </p:ext>
     </p:extLst>
   </p:cSld>
@@ -960,7 +960,7 @@
     </p:spTree>
     <p:extLst>
       <p:ext uri="{BB962C8B-B14F-4D97-AF65-F5344CB8AC3E}">
-        <p14:creationId xmlns:p14="http://schemas.microsoft.com/office/powerpoint/2010/main" xmlns="" val="2288369520"/>
+        <p14:creationId xmlns:p14="http://schemas.microsoft.com/office/powerpoint/2010/main" val="2288369520"/>
       </p:ext>
     </p:extLst>
   </p:cSld>
@@ -1076,7 +1076,7 @@
     </p:spTree>
     <p:extLst>
       <p:ext uri="{BB962C8B-B14F-4D97-AF65-F5344CB8AC3E}">
-        <p14:creationId xmlns:p14="http://schemas.microsoft.com/office/powerpoint/2010/main" xmlns="" val="4112265238"/>
+        <p14:creationId xmlns:p14="http://schemas.microsoft.com/office/powerpoint/2010/main" val="4112265238"/>
       </p:ext>
     </p:extLst>
   </p:cSld>
@@ -1192,7 +1192,7 @@
     </p:spTree>
     <p:extLst>
       <p:ext uri="{BB962C8B-B14F-4D97-AF65-F5344CB8AC3E}">
-        <p14:creationId xmlns:p14="http://schemas.microsoft.com/office/powerpoint/2010/main" xmlns="" val="1838956922"/>
+        <p14:creationId xmlns:p14="http://schemas.microsoft.com/office/powerpoint/2010/main" val="1838956922"/>
       </p:ext>
     </p:extLst>
   </p:cSld>
@@ -1308,7 +1308,7 @@
     </p:spTree>
     <p:extLst>
       <p:ext uri="{BB962C8B-B14F-4D97-AF65-F5344CB8AC3E}">
-        <p14:creationId xmlns:p14="http://schemas.microsoft.com/office/powerpoint/2010/main" xmlns="" val="3052089838"/>
+        <p14:creationId xmlns:p14="http://schemas.microsoft.com/office/powerpoint/2010/main" val="3052089838"/>
       </p:ext>
     </p:extLst>
   </p:cSld>
@@ -1424,7 +1424,7 @@
     </p:spTree>
     <p:extLst>
       <p:ext uri="{BB962C8B-B14F-4D97-AF65-F5344CB8AC3E}">
-        <p14:creationId xmlns:p14="http://schemas.microsoft.com/office/powerpoint/2010/main" xmlns="" val="1864467121"/>
+        <p14:creationId xmlns:p14="http://schemas.microsoft.com/office/powerpoint/2010/main" val="1864467121"/>
       </p:ext>
     </p:extLst>
   </p:cSld>
@@ -1540,7 +1540,7 @@
     </p:spTree>
     <p:extLst>
       <p:ext uri="{BB962C8B-B14F-4D97-AF65-F5344CB8AC3E}">
-        <p14:creationId xmlns:p14="http://schemas.microsoft.com/office/powerpoint/2010/main" xmlns="" val="2026216717"/>
+        <p14:creationId xmlns:p14="http://schemas.microsoft.com/office/powerpoint/2010/main" val="2026216717"/>
       </p:ext>
     </p:extLst>
   </p:cSld>
@@ -1656,7 +1656,7 @@
     </p:spTree>
     <p:extLst>
       <p:ext uri="{BB962C8B-B14F-4D97-AF65-F5344CB8AC3E}">
-        <p14:creationId xmlns:p14="http://schemas.microsoft.com/office/powerpoint/2010/main" xmlns="" val="3242079448"/>
+        <p14:creationId xmlns:p14="http://schemas.microsoft.com/office/powerpoint/2010/main" val="3242079448"/>
       </p:ext>
     </p:extLst>
   </p:cSld>
@@ -1772,7 +1772,7 @@
     </p:spTree>
     <p:extLst>
       <p:ext uri="{BB962C8B-B14F-4D97-AF65-F5344CB8AC3E}">
-        <p14:creationId xmlns:p14="http://schemas.microsoft.com/office/powerpoint/2010/main" xmlns="" val="1652189911"/>
+        <p14:creationId xmlns:p14="http://schemas.microsoft.com/office/powerpoint/2010/main" val="1652189911"/>
       </p:ext>
     </p:extLst>
   </p:cSld>
@@ -1888,7 +1888,7 @@
     </p:spTree>
     <p:extLst>
       <p:ext uri="{BB962C8B-B14F-4D97-AF65-F5344CB8AC3E}">
-        <p14:creationId xmlns:p14="http://schemas.microsoft.com/office/powerpoint/2010/main" xmlns="" val="3692910596"/>
+        <p14:creationId xmlns:p14="http://schemas.microsoft.com/office/powerpoint/2010/main" val="3692910596"/>
       </p:ext>
     </p:extLst>
   </p:cSld>
@@ -2004,7 +2004,7 @@
     </p:spTree>
     <p:extLst>
       <p:ext uri="{BB962C8B-B14F-4D97-AF65-F5344CB8AC3E}">
-        <p14:creationId xmlns:p14="http://schemas.microsoft.com/office/powerpoint/2010/main" xmlns="" val="243126530"/>
+        <p14:creationId xmlns:p14="http://schemas.microsoft.com/office/powerpoint/2010/main" val="243126530"/>
       </p:ext>
     </p:extLst>
   </p:cSld>
@@ -2120,7 +2120,7 @@
     </p:spTree>
     <p:extLst>
       <p:ext uri="{BB962C8B-B14F-4D97-AF65-F5344CB8AC3E}">
-        <p14:creationId xmlns:p14="http://schemas.microsoft.com/office/powerpoint/2010/main" xmlns="" val="2186386724"/>
+        <p14:creationId xmlns:p14="http://schemas.microsoft.com/office/powerpoint/2010/main" val="2186386724"/>
       </p:ext>
     </p:extLst>
   </p:cSld>
@@ -2236,7 +2236,7 @@
     </p:spTree>
     <p:extLst>
       <p:ext uri="{BB962C8B-B14F-4D97-AF65-F5344CB8AC3E}">
-        <p14:creationId xmlns:p14="http://schemas.microsoft.com/office/powerpoint/2010/main" xmlns="" val="1233209275"/>
+        <p14:creationId xmlns:p14="http://schemas.microsoft.com/office/powerpoint/2010/main" val="1233209275"/>
       </p:ext>
     </p:extLst>
   </p:cSld>
@@ -2352,7 +2352,7 @@
     </p:spTree>
     <p:extLst>
       <p:ext uri="{BB962C8B-B14F-4D97-AF65-F5344CB8AC3E}">
-        <p14:creationId xmlns:p14="http://schemas.microsoft.com/office/powerpoint/2010/main" xmlns="" val="1659479035"/>
+        <p14:creationId xmlns:p14="http://schemas.microsoft.com/office/powerpoint/2010/main" val="1659479035"/>
       </p:ext>
     </p:extLst>
   </p:cSld>
@@ -2468,7 +2468,7 @@
     </p:spTree>
     <p:extLst>
       <p:ext uri="{BB962C8B-B14F-4D97-AF65-F5344CB8AC3E}">
-        <p14:creationId xmlns:p14="http://schemas.microsoft.com/office/powerpoint/2010/main" xmlns="" val="2363686062"/>
+        <p14:creationId xmlns:p14="http://schemas.microsoft.com/office/powerpoint/2010/main" val="2363686062"/>
       </p:ext>
     </p:extLst>
   </p:cSld>
@@ -2584,7 +2584,7 @@
     </p:spTree>
     <p:extLst>
       <p:ext uri="{BB962C8B-B14F-4D97-AF65-F5344CB8AC3E}">
-        <p14:creationId xmlns:p14="http://schemas.microsoft.com/office/powerpoint/2010/main" xmlns="" val="3775277122"/>
+        <p14:creationId xmlns:p14="http://schemas.microsoft.com/office/powerpoint/2010/main" val="3775277122"/>
       </p:ext>
     </p:extLst>
   </p:cSld>
@@ -2700,7 +2700,7 @@
     </p:spTree>
     <p:extLst>
       <p:ext uri="{BB962C8B-B14F-4D97-AF65-F5344CB8AC3E}">
-        <p14:creationId xmlns:p14="http://schemas.microsoft.com/office/powerpoint/2010/main" xmlns="" val="487444190"/>
+        <p14:creationId xmlns:p14="http://schemas.microsoft.com/office/powerpoint/2010/main" val="487444190"/>
       </p:ext>
     </p:extLst>
   </p:cSld>
@@ -2816,7 +2816,7 @@
     </p:spTree>
     <p:extLst>
       <p:ext uri="{BB962C8B-B14F-4D97-AF65-F5344CB8AC3E}">
-        <p14:creationId xmlns:p14="http://schemas.microsoft.com/office/powerpoint/2010/main" xmlns="" val="3064408142"/>
+        <p14:creationId xmlns:p14="http://schemas.microsoft.com/office/powerpoint/2010/main" val="3064408142"/>
       </p:ext>
     </p:extLst>
   </p:cSld>
@@ -2932,7 +2932,7 @@
     </p:spTree>
     <p:extLst>
       <p:ext uri="{BB962C8B-B14F-4D97-AF65-F5344CB8AC3E}">
-        <p14:creationId xmlns:p14="http://schemas.microsoft.com/office/powerpoint/2010/main" xmlns="" val="2092233294"/>
+        <p14:creationId xmlns:p14="http://schemas.microsoft.com/office/powerpoint/2010/main" val="2092233294"/>
       </p:ext>
     </p:extLst>
   </p:cSld>
@@ -3048,7 +3048,7 @@
     </p:spTree>
     <p:extLst>
       <p:ext uri="{BB962C8B-B14F-4D97-AF65-F5344CB8AC3E}">
-        <p14:creationId xmlns:p14="http://schemas.microsoft.com/office/powerpoint/2010/main" xmlns="" val="3027527447"/>
+        <p14:creationId xmlns:p14="http://schemas.microsoft.com/office/powerpoint/2010/main" val="3027527447"/>
       </p:ext>
     </p:extLst>
   </p:cSld>
@@ -3164,7 +3164,7 @@
     </p:spTree>
     <p:extLst>
       <p:ext uri="{BB962C8B-B14F-4D97-AF65-F5344CB8AC3E}">
-        <p14:creationId xmlns:p14="http://schemas.microsoft.com/office/powerpoint/2010/main" xmlns="" val="62896525"/>
+        <p14:creationId xmlns:p14="http://schemas.microsoft.com/office/powerpoint/2010/main" val="62896525"/>
       </p:ext>
     </p:extLst>
   </p:cSld>
@@ -3280,7 +3280,7 @@
     </p:spTree>
     <p:extLst>
       <p:ext uri="{BB962C8B-B14F-4D97-AF65-F5344CB8AC3E}">
-        <p14:creationId xmlns:p14="http://schemas.microsoft.com/office/powerpoint/2010/main" xmlns="" val="2735305892"/>
+        <p14:creationId xmlns:p14="http://schemas.microsoft.com/office/powerpoint/2010/main" val="2735305892"/>
       </p:ext>
     </p:extLst>
   </p:cSld>
@@ -3396,7 +3396,7 @@
     </p:spTree>
     <p:extLst>
       <p:ext uri="{BB962C8B-B14F-4D97-AF65-F5344CB8AC3E}">
-        <p14:creationId xmlns:p14="http://schemas.microsoft.com/office/powerpoint/2010/main" xmlns="" val="2117573468"/>
+        <p14:creationId xmlns:p14="http://schemas.microsoft.com/office/powerpoint/2010/main" val="2117573468"/>
       </p:ext>
     </p:extLst>
   </p:cSld>
@@ -3512,7 +3512,7 @@
     </p:spTree>
     <p:extLst>
       <p:ext uri="{BB962C8B-B14F-4D97-AF65-F5344CB8AC3E}">
-        <p14:creationId xmlns:p14="http://schemas.microsoft.com/office/powerpoint/2010/main" xmlns="" val="1096248821"/>
+        <p14:creationId xmlns:p14="http://schemas.microsoft.com/office/powerpoint/2010/main" val="1096248821"/>
       </p:ext>
     </p:extLst>
   </p:cSld>
@@ -3628,7 +3628,7 @@
     </p:spTree>
     <p:extLst>
       <p:ext uri="{BB962C8B-B14F-4D97-AF65-F5344CB8AC3E}">
-        <p14:creationId xmlns:p14="http://schemas.microsoft.com/office/powerpoint/2010/main" xmlns="" val="3712001571"/>
+        <p14:creationId xmlns:p14="http://schemas.microsoft.com/office/powerpoint/2010/main" val="3712001571"/>
       </p:ext>
     </p:extLst>
   </p:cSld>
@@ -3744,7 +3744,7 @@
     </p:spTree>
     <p:extLst>
       <p:ext uri="{BB962C8B-B14F-4D97-AF65-F5344CB8AC3E}">
-        <p14:creationId xmlns:p14="http://schemas.microsoft.com/office/powerpoint/2010/main" xmlns="" val="2843121260"/>
+        <p14:creationId xmlns:p14="http://schemas.microsoft.com/office/powerpoint/2010/main" val="2843121260"/>
       </p:ext>
     </p:extLst>
   </p:cSld>
@@ -3860,7 +3860,7 @@
     </p:spTree>
     <p:extLst>
       <p:ext uri="{BB962C8B-B14F-4D97-AF65-F5344CB8AC3E}">
-        <p14:creationId xmlns:p14="http://schemas.microsoft.com/office/powerpoint/2010/main" xmlns="" val="2186386724"/>
+        <p14:creationId xmlns:p14="http://schemas.microsoft.com/office/powerpoint/2010/main" val="2186386724"/>
       </p:ext>
     </p:extLst>
   </p:cSld>
@@ -3976,7 +3976,7 @@
     </p:spTree>
     <p:extLst>
       <p:ext uri="{BB962C8B-B14F-4D97-AF65-F5344CB8AC3E}">
-        <p14:creationId xmlns:p14="http://schemas.microsoft.com/office/powerpoint/2010/main" xmlns="" val="8306688"/>
+        <p14:creationId xmlns:p14="http://schemas.microsoft.com/office/powerpoint/2010/main" val="8306688"/>
       </p:ext>
     </p:extLst>
   </p:cSld>
@@ -4092,7 +4092,7 @@
     </p:spTree>
     <p:extLst>
       <p:ext uri="{BB962C8B-B14F-4D97-AF65-F5344CB8AC3E}">
-        <p14:creationId xmlns:p14="http://schemas.microsoft.com/office/powerpoint/2010/main" xmlns="" val="1774208858"/>
+        <p14:creationId xmlns:p14="http://schemas.microsoft.com/office/powerpoint/2010/main" val="1774208858"/>
       </p:ext>
     </p:extLst>
   </p:cSld>
@@ -4208,7 +4208,7 @@
     </p:spTree>
     <p:extLst>
       <p:ext uri="{BB962C8B-B14F-4D97-AF65-F5344CB8AC3E}">
-        <p14:creationId xmlns:p14="http://schemas.microsoft.com/office/powerpoint/2010/main" xmlns="" val="4139664514"/>
+        <p14:creationId xmlns:p14="http://schemas.microsoft.com/office/powerpoint/2010/main" val="4139664514"/>
       </p:ext>
     </p:extLst>
   </p:cSld>
@@ -4324,7 +4324,7 @@
     </p:spTree>
     <p:extLst>
       <p:ext uri="{BB962C8B-B14F-4D97-AF65-F5344CB8AC3E}">
-        <p14:creationId xmlns:p14="http://schemas.microsoft.com/office/powerpoint/2010/main" xmlns="" val="2775095457"/>
+        <p14:creationId xmlns:p14="http://schemas.microsoft.com/office/powerpoint/2010/main" val="2775095457"/>
       </p:ext>
     </p:extLst>
   </p:cSld>
@@ -4440,7 +4440,7 @@
     </p:spTree>
     <p:extLst>
       <p:ext uri="{BB962C8B-B14F-4D97-AF65-F5344CB8AC3E}">
-        <p14:creationId xmlns:p14="http://schemas.microsoft.com/office/powerpoint/2010/main" xmlns="" val="636295771"/>
+        <p14:creationId xmlns:p14="http://schemas.microsoft.com/office/powerpoint/2010/main" val="636295771"/>
       </p:ext>
     </p:extLst>
   </p:cSld>
@@ -12118,33 +12118,41 @@
               </a:tabLst>
             </a:pPr>
             <a:r>
-              <a:rPr lang="de-DE" sz="2600" smtClean="0"/>
-              <a:t>In Java gibt es das spezielle Literal </a:t>
-            </a:r>
-            <a:r>
-              <a:rPr lang="de-DE" sz="2600" smtClean="0">
+              <a:rPr lang="de-DE" sz="2600" dirty="0" smtClean="0"/>
+              <a:t>In Java gibt es das spezielle </a:t>
+            </a:r>
+            <a:r>
+              <a:rPr lang="de-DE" sz="2600" dirty="0" err="1" smtClean="0"/>
+              <a:t>Literal</a:t>
+            </a:r>
+            <a:r>
+              <a:rPr lang="de-DE" sz="2600" dirty="0" smtClean="0"/>
+              <a:t> </a:t>
+            </a:r>
+            <a:r>
+              <a:rPr lang="de-DE" sz="2600" dirty="0" smtClean="0">
                 <a:latin typeface="Courier New" pitchFamily="49" charset="0"/>
               </a:rPr>
               <a:t>null</a:t>
             </a:r>
             <a:r>
-              <a:rPr lang="de-DE" sz="2600" smtClean="0"/>
+              <a:rPr lang="de-DE" sz="2600" dirty="0" smtClean="0"/>
               <a:t>, das anzeigt, dass eine Referenzvariable auf kein Objekt verweist. Der Wert ist nur für Referenzen vorgesehen und kann in keinen primitiven Typ wie die Ganzzahl </a:t>
             </a:r>
             <a:r>
-              <a:rPr lang="de-DE" sz="2600" smtClean="0">
+              <a:rPr lang="de-DE" sz="2600" dirty="0" smtClean="0">
                 <a:latin typeface="Courier New" pitchFamily="49" charset="0"/>
               </a:rPr>
               <a:t>0</a:t>
             </a:r>
             <a:r>
-              <a:rPr lang="de-DE" sz="2600" smtClean="0"/>
+              <a:rPr lang="de-DE" sz="2600" dirty="0" smtClean="0"/>
               <a:t> umgewandelt werden.</a:t>
             </a:r>
             <a:br>
-              <a:rPr lang="de-DE" sz="2600" smtClean="0"/>
+              <a:rPr lang="de-DE" sz="2600" dirty="0" smtClean="0"/>
             </a:br>
-            <a:endParaRPr lang="de-DE" sz="2600" smtClean="0"/>
+            <a:endParaRPr lang="de-DE" sz="2600" dirty="0" smtClean="0"/>
           </a:p>
           <a:p>
             <a:pPr marL="269875" indent="-269875" eaLnBrk="1">
@@ -12170,46 +12178,66 @@
               </a:tabLst>
             </a:pPr>
             <a:r>
-              <a:rPr lang="de-DE" sz="2600" smtClean="0"/>
-              <a:t>Die null-Referenz ist typenlos, das heißt, sie kann jedem Objekt zugewiesen und jeder Funktion übergeben werden, die ein Objekt erwartet – Beispiele:</a:t>
+              <a:rPr lang="de-DE" sz="2600" dirty="0" smtClean="0"/>
+              <a:t>Die null-Referenz ist </a:t>
+            </a:r>
+            <a:r>
+              <a:rPr lang="de-DE" sz="2600" dirty="0" err="1" smtClean="0"/>
+              <a:t>typenlos</a:t>
+            </a:r>
+            <a:r>
+              <a:rPr lang="de-DE" sz="2600" dirty="0" smtClean="0"/>
+              <a:t>, das heißt, sie kann jedem Objekt zugewiesen und jeder Funktion übergeben werden, die ein Objekt erwartet – Beispiele:</a:t>
             </a:r>
             <a:br>
-              <a:rPr lang="de-DE" sz="2600" smtClean="0"/>
+              <a:rPr lang="de-DE" sz="2600" dirty="0" smtClean="0"/>
             </a:br>
             <a:r>
-              <a:rPr lang="de-DE" sz="2600" smtClean="0"/>
+              <a:rPr lang="de-DE" sz="2600" dirty="0" smtClean="0"/>
               <a:t/>
             </a:r>
             <a:br>
-              <a:rPr lang="de-DE" sz="2600" smtClean="0"/>
+              <a:rPr lang="de-DE" sz="2600" dirty="0" smtClean="0"/>
             </a:br>
             <a:r>
-              <a:rPr lang="de-DE" sz="2600" smtClean="0">
+              <a:rPr lang="de-DE" sz="2600" dirty="0" smtClean="0">
                 <a:latin typeface="Courier New" pitchFamily="49" charset="0"/>
               </a:rPr>
-              <a:t>Point  p = null;</a:t>
+              <a:t>Auto a </a:t>
+            </a:r>
+            <a:r>
+              <a:rPr lang="de-DE" sz="2600" dirty="0" smtClean="0">
+                <a:latin typeface="Courier New" pitchFamily="49" charset="0"/>
+              </a:rPr>
+              <a:t>= null;</a:t>
             </a:r>
             <a:br>
-              <a:rPr lang="de-DE" sz="2600" smtClean="0">
+              <a:rPr lang="de-DE" sz="2600" dirty="0" smtClean="0">
                 <a:latin typeface="Courier New" pitchFamily="49" charset="0"/>
               </a:rPr>
             </a:br>
             <a:r>
-              <a:rPr lang="de-DE" sz="2600" smtClean="0">
+              <a:rPr lang="de-DE" sz="2600" dirty="0" smtClean="0">
                 <a:latin typeface="Courier New" pitchFamily="49" charset="0"/>
               </a:rPr>
               <a:t>String s = null;</a:t>
             </a:r>
             <a:br>
-              <a:rPr lang="de-DE" sz="2600" smtClean="0">
+              <a:rPr lang="de-DE" sz="2600" dirty="0" smtClean="0">
                 <a:latin typeface="Courier New" pitchFamily="49" charset="0"/>
               </a:rPr>
             </a:br>
             <a:r>
-              <a:rPr lang="de-DE" sz="2600" smtClean="0">
+              <a:rPr lang="de-DE" sz="2600" dirty="0" err="1" smtClean="0">
                 <a:latin typeface="Courier New" pitchFamily="49" charset="0"/>
               </a:rPr>
-              <a:t>System.out.println( null );</a:t>
+              <a:t>System.out.println</a:t>
+            </a:r>
+            <a:r>
+              <a:rPr lang="de-DE" sz="2600" dirty="0" smtClean="0">
+                <a:latin typeface="Courier New" pitchFamily="49" charset="0"/>
+              </a:rPr>
+              <a:t>( null );</a:t>
             </a:r>
           </a:p>
           <a:p>
@@ -12238,7 +12266,7 @@
                 <a:tab pos="8686800" algn="l"/>
               </a:tabLst>
             </a:pPr>
-            <a:endParaRPr lang="de-DE" sz="2800" smtClean="0">
+            <a:endParaRPr lang="de-DE" sz="2800" dirty="0" smtClean="0">
               <a:latin typeface="Courier New" pitchFamily="49" charset="0"/>
             </a:endParaRPr>
           </a:p>
@@ -12265,7 +12293,7 @@
                 <a:tab pos="8686800" algn="l"/>
               </a:tabLst>
             </a:pPr>
-            <a:endParaRPr lang="de-DE" smtClean="0"/>
+            <a:endParaRPr lang="de-DE" dirty="0" smtClean="0"/>
           </a:p>
           <a:p>
             <a:pPr marL="269875" indent="-269875" eaLnBrk="1">
@@ -12290,7 +12318,7 @@
                 <a:tab pos="8686800" algn="l"/>
               </a:tabLst>
             </a:pPr>
-            <a:endParaRPr lang="de-DE" smtClean="0"/>
+            <a:endParaRPr lang="de-DE" dirty="0" smtClean="0"/>
           </a:p>
         </p:txBody>
       </p:sp>
@@ -12525,43 +12553,49 @@
               </a:tabLst>
             </a:pPr>
             <a:r>
-              <a:rPr lang="de-DE" sz="2800" smtClean="0"/>
+              <a:rPr lang="de-DE" sz="2800" dirty="0" smtClean="0"/>
               <a:t>Da es nur ein </a:t>
             </a:r>
             <a:r>
-              <a:rPr lang="de-DE" sz="2800" smtClean="0">
+              <a:rPr lang="de-DE" sz="2800" dirty="0" smtClean="0">
                 <a:latin typeface="Courier New" pitchFamily="49" charset="0"/>
               </a:rPr>
               <a:t>null</a:t>
             </a:r>
             <a:r>
-              <a:rPr lang="de-DE" sz="2800" smtClean="0"/>
+              <a:rPr lang="de-DE" sz="2800" dirty="0" smtClean="0"/>
               <a:t> gibt, gilt zum Beispiel</a:t>
             </a:r>
             <a:br>
-              <a:rPr lang="de-DE" sz="2800" smtClean="0"/>
+              <a:rPr lang="de-DE" sz="2800" dirty="0" smtClean="0"/>
             </a:br>
             <a:r>
-              <a:rPr lang="de-DE" sz="2800" smtClean="0"/>
+              <a:rPr lang="de-DE" sz="2800" dirty="0" smtClean="0"/>
               <a:t/>
             </a:r>
             <a:br>
-              <a:rPr lang="de-DE" sz="2800" smtClean="0"/>
+              <a:rPr lang="de-DE" sz="2800" dirty="0" smtClean="0"/>
             </a:br>
             <a:r>
-              <a:rPr lang="de-DE" sz="2800" smtClean="0">
+              <a:rPr lang="de-DE" sz="2800" dirty="0" smtClean="0">
                 <a:latin typeface="Courier New" pitchFamily="49" charset="0"/>
               </a:rPr>
-              <a:t>(Point) null == (String) null</a:t>
-            </a:r>
-            <a:r>
-              <a:rPr lang="de-DE" sz="2800" smtClean="0"/>
+              <a:t>(Auto) </a:t>
+            </a:r>
+            <a:r>
+              <a:rPr lang="de-DE" sz="2800" dirty="0" smtClean="0">
+                <a:latin typeface="Courier New" pitchFamily="49" charset="0"/>
+              </a:rPr>
+              <a:t>null == (String) null</a:t>
+            </a:r>
+            <a:r>
+              <a:rPr lang="de-DE" sz="2800" dirty="0" smtClean="0"/>
               <a:t/>
             </a:r>
             <a:br>
-              <a:rPr lang="de-DE" sz="2800" smtClean="0"/>
+              <a:rPr lang="de-DE" sz="2800" dirty="0" smtClean="0"/>
             </a:br>
-            <a:endParaRPr lang="de-DE" sz="2800" smtClean="0"/>
+            <a:endParaRPr lang="de-DE" sz="2800" dirty="0" smtClean="0"/>
           </a:p>
           <a:p>
             <a:pPr marL="269875" indent="-269875" eaLnBrk="1">
@@ -12587,8 +12621,16 @@
               </a:tabLst>
             </a:pPr>
             <a:r>
-              <a:rPr lang="de-DE" sz="2800" smtClean="0"/>
-              <a:t>Der Haupteinsatz sieht vor, damit uninitialisierte Referenzvariablen zu kennzeichnen.</a:t>
+              <a:rPr lang="de-DE" sz="2800" dirty="0" smtClean="0"/>
+              <a:t>Der Haupteinsatz sieht vor, damit </a:t>
+            </a:r>
+            <a:r>
+              <a:rPr lang="de-DE" sz="2800" dirty="0" err="1" smtClean="0"/>
+              <a:t>uninitialisierte</a:t>
+            </a:r>
+            <a:r>
+              <a:rPr lang="de-DE" sz="2800" dirty="0" smtClean="0"/>
+              <a:t> Referenzvariablen zu kennzeichnen.</a:t>
             </a:r>
           </a:p>
           <a:p>
@@ -12614,7 +12656,7 @@
                 <a:tab pos="8686800" algn="l"/>
               </a:tabLst>
             </a:pPr>
-            <a:endParaRPr lang="de-DE" smtClean="0"/>
+            <a:endParaRPr lang="de-DE" dirty="0" smtClean="0"/>
           </a:p>
           <a:p>
             <a:pPr marL="269875" indent="-269875" eaLnBrk="1">
@@ -12639,7 +12681,7 @@
                 <a:tab pos="8686800" algn="l"/>
               </a:tabLst>
             </a:pPr>
-            <a:endParaRPr lang="de-DE" smtClean="0"/>
+            <a:endParaRPr lang="de-DE" dirty="0" smtClean="0"/>
           </a:p>
         </p:txBody>
       </p:sp>
@@ -13207,11 +13249,6 @@
               </a:rPr>
               <a:t>-Kommandozeile</a:t>
             </a:r>
-            <a:endParaRPr lang="de-DE" sz="4000" dirty="0" smtClean="0">
-              <a:solidFill>
-                <a:srgbClr val="FFFFFF"/>
-              </a:solidFill>
-            </a:endParaRPr>
           </a:p>
         </p:txBody>
       </p:sp>
@@ -13327,11 +13364,7 @@
             </a:pPr>
             <a:r>
               <a:rPr lang="de-DE" sz="2600" dirty="0" smtClean="0"/>
-              <a:t>In Zusammenarbeit </a:t>
-            </a:r>
-            <a:r>
-              <a:rPr lang="de-DE" sz="2600" dirty="0" smtClean="0"/>
-              <a:t>mit CodeSchool </a:t>
+              <a:t>In Zusammenarbeit mit CodeSchool </a:t>
             </a:r>
             <a:r>
               <a:rPr lang="de-DE" sz="2000" dirty="0" smtClean="0"/>
@@ -13341,13 +13374,7 @@
               <a:rPr lang="de-DE" sz="2000" dirty="0" smtClean="0">
                 <a:hlinkClick r:id="rId3"/>
               </a:rPr>
-              <a:t>https://</a:t>
-            </a:r>
-            <a:r>
-              <a:rPr lang="de-DE" sz="2000" dirty="0" smtClean="0">
-                <a:hlinkClick r:id="rId3"/>
-              </a:rPr>
-              <a:t>www.codeschool.com</a:t>
+              <a:t>https://www.codeschool.com</a:t>
             </a:r>
             <a:r>
               <a:rPr lang="de-DE" sz="2000" dirty="0" smtClean="0"/>
@@ -13355,11 +13382,7 @@
             </a:r>
             <a:r>
               <a:rPr lang="de-DE" sz="2600" dirty="0" smtClean="0"/>
-              <a:t> </a:t>
-            </a:r>
-            <a:r>
-              <a:rPr lang="de-DE" sz="2600" dirty="0" smtClean="0"/>
-              <a:t>bietet </a:t>
+              <a:t> bietet </a:t>
             </a:r>
             <a:r>
               <a:rPr lang="de-DE" sz="2600" dirty="0" err="1" smtClean="0"/>
@@ -13384,13 +13407,7 @@
               <a:rPr lang="de-DE" sz="2600" dirty="0" smtClean="0">
                 <a:hlinkClick r:id="rId4"/>
               </a:rPr>
-              <a:t>https://</a:t>
-            </a:r>
-            <a:r>
-              <a:rPr lang="de-DE" sz="2600" dirty="0" smtClean="0">
-                <a:hlinkClick r:id="rId4"/>
-              </a:rPr>
-              <a:t>try.github.io</a:t>
+              <a:t>https://try.github.io</a:t>
             </a:r>
             <a:endParaRPr lang="de-DE" sz="2600" dirty="0" smtClean="0"/>
           </a:p>
@@ -13602,13 +13619,7 @@
               <a:rPr lang="de-DE" sz="2200" dirty="0" smtClean="0">
                 <a:hlinkClick r:id="rId5"/>
               </a:rPr>
-              <a:t>https://</a:t>
-            </a:r>
-            <a:r>
-              <a:rPr lang="de-DE" sz="2200" dirty="0" smtClean="0">
-                <a:hlinkClick r:id="rId5"/>
-              </a:rPr>
-              <a:t>training.github.com/kit/downloads/github-git-cheat-sheet.pdf</a:t>
+              <a:t>https://training.github.com/kit/downloads/github-git-cheat-sheet.pdf</a:t>
             </a:r>
             <a:endParaRPr lang="de-DE" sz="2200" dirty="0" smtClean="0"/>
           </a:p>

</xml_diff>